<commit_message>
Updated graph editor intro + small updates exercises
GraphEditor Introduction (pptx + pdf) updated.
Exercises: Only three small things. (E.g. and -> an)
</commit_message>
<xml_diff>
--- a/CSS2019/doc/GraphEditor introduction.pptx
+++ b/CSS2019/doc/GraphEditor introduction.pptx
@@ -9,8 +9,8 @@
   </p:notesMasterIdLst>
   <p:sldIdLst>
     <p:sldId id="256" r:id="rId2"/>
-    <p:sldId id="257" r:id="rId3"/>
-    <p:sldId id="258" r:id="rId4"/>
+    <p:sldId id="267" r:id="rId3"/>
+    <p:sldId id="268" r:id="rId4"/>
     <p:sldId id="259" r:id="rId5"/>
     <p:sldId id="260" r:id="rId6"/>
     <p:sldId id="261" r:id="rId7"/>
@@ -206,7 +206,7 @@
           </a:lstStyle>
           <a:p>
             <a:fld id="{40874CF6-D45C-5744-8556-A75C8F417754}" type="datetimeFigureOut">
-              <a:t>2018-10-27</a:t>
+              <a:t>2019-05-23</a:t>
             </a:fld>
             <a:endParaRPr lang="sv-SE"/>
           </a:p>
@@ -684,7 +684,7 @@
           <a:lstStyle/>
           <a:p>
             <a:fld id="{8C5B0BAF-7654-EA40-A022-F46B0B5A6508}" type="datetime1">
-              <a:t>2018-10-27</a:t>
+              <a:t>2019-05-23</a:t>
             </a:fld>
             <a:endParaRPr lang="sv-SE"/>
           </a:p>
@@ -850,7 +850,7 @@
           <a:lstStyle/>
           <a:p>
             <a:fld id="{0F7A66E6-6089-9F41-B6ED-B82A14365DAD}" type="datetime1">
-              <a:t>2018-10-27</a:t>
+              <a:t>2019-05-23</a:t>
             </a:fld>
             <a:endParaRPr lang="sv-SE"/>
           </a:p>
@@ -1091,7 +1091,7 @@
           <a:lstStyle/>
           <a:p>
             <a:fld id="{840AACF3-37AF-A548-ACC1-1F41B9031AAC}" type="datetime1">
-              <a:t>2018-10-27</a:t>
+              <a:t>2019-05-23</a:t>
             </a:fld>
             <a:endParaRPr lang="sv-SE"/>
           </a:p>
@@ -1318,7 +1318,7 @@
           <a:lstStyle/>
           <a:p>
             <a:fld id="{F7C06B23-2216-5640-9639-390C05E8E2F9}" type="datetime1">
-              <a:t>2018-10-27</a:t>
+              <a:t>2019-05-23</a:t>
             </a:fld>
             <a:endParaRPr lang="sv-SE"/>
           </a:p>
@@ -1680,7 +1680,7 @@
           <a:lstStyle/>
           <a:p>
             <a:fld id="{9B1397CB-A82D-2A44-9159-FFC3DA7F5988}" type="datetime1">
-              <a:t>2018-10-27</a:t>
+              <a:t>2019-05-23</a:t>
             </a:fld>
             <a:endParaRPr lang="sv-SE"/>
           </a:p>
@@ -1800,7 +1800,7 @@
           <a:lstStyle/>
           <a:p>
             <a:fld id="{BA164D19-F7B9-C047-8843-E74B1555EBE5}" type="datetime1">
-              <a:t>2018-10-27</a:t>
+              <a:t>2019-05-23</a:t>
             </a:fld>
             <a:endParaRPr lang="sv-SE"/>
           </a:p>
@@ -1893,7 +1893,7 @@
           <a:lstStyle/>
           <a:p>
             <a:fld id="{8711B8DD-2978-CF46-82A5-C5C433C1AABD}" type="datetime1">
-              <a:t>2018-10-27</a:t>
+              <a:t>2019-05-23</a:t>
             </a:fld>
             <a:endParaRPr lang="sv-SE"/>
           </a:p>
@@ -2102,7 +2102,7 @@
           </a:lstStyle>
           <a:p>
             <a:fld id="{1C70CCC2-C365-9348-8CB6-8D14A4E27626}" type="datetime1">
-              <a:t>2018-10-27</a:t>
+              <a:t>2019-05-23</a:t>
             </a:fld>
             <a:endParaRPr lang="sv-SE"/>
           </a:p>
@@ -3837,92 +3837,6 @@
           <a:chExt cx="0" cy="0"/>
         </a:xfrm>
       </p:grpSpPr>
-      <p:grpSp>
-        <p:nvGrpSpPr>
-          <p:cNvPr id="8" name="Group 7">
-            <a:extLst>
-              <a:ext uri="{FF2B5EF4-FFF2-40B4-BE49-F238E27FC236}">
-                <a16:creationId xmlns:a16="http://schemas.microsoft.com/office/drawing/2014/main" id="{011FFF7B-80F8-2547-96CE-12A9F1DAC54C}"/>
-              </a:ext>
-            </a:extLst>
-          </p:cNvPr>
-          <p:cNvGrpSpPr/>
-          <p:nvPr/>
-        </p:nvGrpSpPr>
-        <p:grpSpPr>
-          <a:xfrm>
-            <a:off x="945165" y="1204812"/>
-            <a:ext cx="8015670" cy="5302800"/>
-            <a:chOff x="721584" y="1114500"/>
-            <a:chExt cx="8015670" cy="5302800"/>
-          </a:xfrm>
-        </p:grpSpPr>
-        <p:pic>
-          <p:nvPicPr>
-            <p:cNvPr id="4" name="Picture 3">
-              <a:extLst>
-                <a:ext uri="{FF2B5EF4-FFF2-40B4-BE49-F238E27FC236}">
-                  <a16:creationId xmlns:a16="http://schemas.microsoft.com/office/drawing/2014/main" id="{A2836CE2-2A06-CC42-A2C6-69B6F4C8381E}"/>
-                </a:ext>
-              </a:extLst>
-            </p:cNvPr>
-            <p:cNvPicPr>
-              <a:picLocks noChangeAspect="1"/>
-            </p:cNvPicPr>
-            <p:nvPr/>
-          </p:nvPicPr>
-          <p:blipFill>
-            <a:blip r:embed="rId2"/>
-            <a:stretch>
-              <a:fillRect/>
-            </a:stretch>
-          </p:blipFill>
-          <p:spPr>
-            <a:xfrm>
-              <a:off x="721584" y="1114500"/>
-              <a:ext cx="8015670" cy="5302800"/>
-            </a:xfrm>
-            <a:prstGeom prst="rect">
-              <a:avLst/>
-            </a:prstGeom>
-            <a:ln>
-              <a:solidFill>
-                <a:schemeClr val="tx1"/>
-              </a:solidFill>
-            </a:ln>
-          </p:spPr>
-        </p:pic>
-        <p:pic>
-          <p:nvPicPr>
-            <p:cNvPr id="5" name="Picture 4">
-              <a:extLst>
-                <a:ext uri="{FF2B5EF4-FFF2-40B4-BE49-F238E27FC236}">
-                  <a16:creationId xmlns:a16="http://schemas.microsoft.com/office/drawing/2014/main" id="{0E9F408D-8DCE-4A48-A98F-CA2B4181A03C}"/>
-                </a:ext>
-              </a:extLst>
-            </p:cNvPr>
-            <p:cNvPicPr>
-              <a:picLocks noChangeAspect="1"/>
-            </p:cNvPicPr>
-            <p:nvPr/>
-          </p:nvPicPr>
-          <p:blipFill>
-            <a:blip r:embed="rId3"/>
-            <a:stretch>
-              <a:fillRect/>
-            </a:stretch>
-          </p:blipFill>
-          <p:spPr>
-            <a:xfrm>
-              <a:off x="836178" y="3506859"/>
-              <a:ext cx="5865397" cy="2196265"/>
-            </a:xfrm>
-            <a:prstGeom prst="rect">
-              <a:avLst/>
-            </a:prstGeom>
-          </p:spPr>
-        </p:pic>
-      </p:grpSp>
       <p:sp>
         <p:nvSpPr>
           <p:cNvPr id="7" name="Title 6">
@@ -3983,10 +3897,45 @@
           </a:p>
         </p:txBody>
       </p:sp>
+      <p:pic>
+        <p:nvPicPr>
+          <p:cNvPr id="6" name="Picture 5">
+            <a:extLst>
+              <a:ext uri="{FF2B5EF4-FFF2-40B4-BE49-F238E27FC236}">
+                <a16:creationId xmlns:a16="http://schemas.microsoft.com/office/drawing/2014/main" id="{17C0617F-6B22-224B-9EE0-BAD93C89F34A}"/>
+              </a:ext>
+            </a:extLst>
+          </p:cNvPr>
+          <p:cNvPicPr>
+            <a:picLocks noChangeAspect="1"/>
+          </p:cNvPicPr>
+          <p:nvPr/>
+        </p:nvPicPr>
+        <p:blipFill>
+          <a:blip r:embed="rId2"/>
+          <a:stretch>
+            <a:fillRect/>
+          </a:stretch>
+        </p:blipFill>
+        <p:spPr>
+          <a:xfrm>
+            <a:off x="900321" y="1100304"/>
+            <a:ext cx="7865307" cy="5499909"/>
+          </a:xfrm>
+          <a:prstGeom prst="rect">
+            <a:avLst/>
+          </a:prstGeom>
+          <a:ln>
+            <a:solidFill>
+              <a:schemeClr val="tx1"/>
+            </a:solidFill>
+          </a:ln>
+        </p:spPr>
+      </p:pic>
     </p:spTree>
     <p:extLst>
       <p:ext uri="{BB962C8B-B14F-4D97-AF65-F5344CB8AC3E}">
-        <p14:creationId xmlns:p14="http://schemas.microsoft.com/office/powerpoint/2010/main" val="2258474424"/>
+        <p14:creationId xmlns:p14="http://schemas.microsoft.com/office/powerpoint/2010/main" val="734944032"/>
       </p:ext>
     </p:extLst>
   </p:cSld>
@@ -4044,12 +3993,41 @@
           </a:p>
         </p:txBody>
       </p:sp>
+      <p:sp>
+        <p:nvSpPr>
+          <p:cNvPr id="3" name="Slide Number Placeholder 2">
+            <a:extLst>
+              <a:ext uri="{FF2B5EF4-FFF2-40B4-BE49-F238E27FC236}">
+                <a16:creationId xmlns:a16="http://schemas.microsoft.com/office/drawing/2014/main" id="{1BFB2962-CC64-BE41-84A9-4FEB2C6D04D0}"/>
+              </a:ext>
+            </a:extLst>
+          </p:cNvPr>
+          <p:cNvSpPr>
+            <a:spLocks noGrp="1"/>
+          </p:cNvSpPr>
+          <p:nvPr>
+            <p:ph type="sldNum" sz="quarter" idx="12"/>
+          </p:nvPr>
+        </p:nvSpPr>
+        <p:spPr/>
+        <p:txBody>
+          <a:bodyPr/>
+          <a:lstStyle/>
+          <a:p>
+            <a:fld id="{B92EE303-D650-3345-864C-D476979F360C}" type="slidenum">
+              <a:rPr lang="sv-SE"/>
+              <a:t>3</a:t>
+            </a:fld>
+            <a:endParaRPr lang="sv-SE"/>
+          </a:p>
+        </p:txBody>
+      </p:sp>
       <p:grpSp>
         <p:nvGrpSpPr>
-          <p:cNvPr id="2" name="Group 1">
-            <a:extLst>
-              <a:ext uri="{FF2B5EF4-FFF2-40B4-BE49-F238E27FC236}">
-                <a16:creationId xmlns:a16="http://schemas.microsoft.com/office/drawing/2014/main" id="{4AF0D9F5-0C10-3C46-A678-7BDEE69FC887}"/>
+          <p:cNvPr id="17" name="Group 16">
+            <a:extLst>
+              <a:ext uri="{FF2B5EF4-FFF2-40B4-BE49-F238E27FC236}">
+                <a16:creationId xmlns:a16="http://schemas.microsoft.com/office/drawing/2014/main" id="{CDDB8FB2-FCF9-8B48-B03E-DF114818DC5B}"/>
               </a:ext>
             </a:extLst>
           </p:cNvPr>
@@ -4060,7 +4038,7 @@
           <a:xfrm>
             <a:off x="943827" y="1274406"/>
             <a:ext cx="8018347" cy="5304571"/>
-            <a:chOff x="1794028" y="1274406"/>
+            <a:chOff x="943827" y="1274406"/>
             <a:chExt cx="8018347" cy="5304571"/>
           </a:xfrm>
         </p:grpSpPr>
@@ -4098,7 +4076,7 @@
           </p:blipFill>
           <p:spPr>
             <a:xfrm>
-              <a:off x="1794028" y="1274406"/>
+              <a:off x="943827" y="1274406"/>
               <a:ext cx="8018347" cy="5304571"/>
             </a:xfrm>
             <a:prstGeom prst="rect">
@@ -4125,7 +4103,7 @@
           </p:nvSpPr>
           <p:spPr>
             <a:xfrm>
-              <a:off x="1794136" y="1296067"/>
+              <a:off x="943935" y="1296067"/>
               <a:ext cx="6004299" cy="5282910"/>
             </a:xfrm>
             <a:prstGeom prst="rect">
@@ -4184,7 +4162,7 @@
           </p:nvSpPr>
           <p:spPr>
             <a:xfrm>
-              <a:off x="7806517" y="1291991"/>
+              <a:off x="6956316" y="1291991"/>
               <a:ext cx="1973595" cy="1699015"/>
             </a:xfrm>
             <a:prstGeom prst="rect">
@@ -4236,7 +4214,7 @@
           </p:nvSpPr>
           <p:spPr>
             <a:xfrm>
-              <a:off x="8153098" y="1813392"/>
+              <a:off x="7302897" y="1813392"/>
               <a:ext cx="1207382" cy="877163"/>
             </a:xfrm>
             <a:prstGeom prst="rect">
@@ -4293,7 +4271,7 @@
           </p:nvSpPr>
           <p:spPr>
             <a:xfrm>
-              <a:off x="7810731" y="3005218"/>
+              <a:off x="6960530" y="3005218"/>
               <a:ext cx="1983654" cy="612976"/>
             </a:xfrm>
             <a:prstGeom prst="rect">
@@ -4352,7 +4330,7 @@
           </p:nvSpPr>
           <p:spPr>
             <a:xfrm>
-              <a:off x="7815204" y="5136098"/>
+              <a:off x="6965003" y="5136098"/>
               <a:ext cx="1983654" cy="1060704"/>
             </a:xfrm>
             <a:prstGeom prst="rect">
@@ -4411,7 +4389,7 @@
           </p:nvSpPr>
           <p:spPr>
             <a:xfrm>
-              <a:off x="7823005" y="3618194"/>
+              <a:off x="6972804" y="3618194"/>
               <a:ext cx="1983654" cy="1517904"/>
             </a:xfrm>
             <a:prstGeom prst="rect">
@@ -4470,7 +4448,7 @@
           </p:nvSpPr>
           <p:spPr>
             <a:xfrm>
-              <a:off x="7822546" y="6187658"/>
+              <a:off x="6972345" y="6187658"/>
               <a:ext cx="1983654" cy="388797"/>
             </a:xfrm>
             <a:prstGeom prst="rect">
@@ -4515,48 +4493,6 @@
             </a:p>
           </p:txBody>
         </p:sp>
-        <p:pic>
-          <p:nvPicPr>
-            <p:cNvPr id="15" name="Picture 14">
-              <a:extLst>
-                <a:ext uri="{FF2B5EF4-FFF2-40B4-BE49-F238E27FC236}">
-                  <a16:creationId xmlns:a16="http://schemas.microsoft.com/office/drawing/2014/main" id="{C27483E3-DB8E-CA4E-9F26-B610CB7F05F4}"/>
-                </a:ext>
-              </a:extLst>
-            </p:cNvPr>
-            <p:cNvPicPr>
-              <a:picLocks noChangeAspect="1"/>
-            </p:cNvPicPr>
-            <p:nvPr/>
-          </p:nvPicPr>
-          <p:blipFill>
-            <a:blip r:embed="rId4">
-              <a:extLst>
-                <a:ext uri="{BEBA8EAE-BF5A-486C-A8C5-ECC9F3942E4B}">
-                  <a14:imgProps xmlns:a14="http://schemas.microsoft.com/office/drawing/2010/main">
-                    <a14:imgLayer>
-                      <a14:imgEffect>
-                        <a14:sharpenSoften amount="-50000"/>
-                      </a14:imgEffect>
-                    </a14:imgLayer>
-                  </a14:imgProps>
-                </a:ext>
-              </a:extLst>
-            </a:blip>
-            <a:stretch>
-              <a:fillRect/>
-            </a:stretch>
-          </p:blipFill>
-          <p:spPr>
-            <a:xfrm>
-              <a:off x="1908622" y="3676192"/>
-              <a:ext cx="5865397" cy="2196265"/>
-            </a:xfrm>
-            <a:prstGeom prst="rect">
-              <a:avLst/>
-            </a:prstGeom>
-          </p:spPr>
-        </p:pic>
         <p:sp>
           <p:nvSpPr>
             <p:cNvPr id="16" name="Rectangle 15">
@@ -4571,7 +4507,7 @@
           </p:nvSpPr>
           <p:spPr>
             <a:xfrm>
-              <a:off x="3849493" y="2552754"/>
+              <a:off x="2999292" y="2552754"/>
               <a:ext cx="1983654" cy="1517904"/>
             </a:xfrm>
             <a:prstGeom prst="rect">
@@ -4614,40 +4550,105 @@
             </a:p>
           </p:txBody>
         </p:sp>
+        <p:pic>
+          <p:nvPicPr>
+            <p:cNvPr id="4" name="Picture 3">
+              <a:extLst>
+                <a:ext uri="{FF2B5EF4-FFF2-40B4-BE49-F238E27FC236}">
+                  <a16:creationId xmlns:a16="http://schemas.microsoft.com/office/drawing/2014/main" id="{CF042D6C-4F5E-4D44-958A-E8DE92B95F4E}"/>
+                </a:ext>
+              </a:extLst>
+            </p:cNvPr>
+            <p:cNvPicPr>
+              <a:picLocks noChangeAspect="1"/>
+            </p:cNvPicPr>
+            <p:nvPr/>
+          </p:nvPicPr>
+          <p:blipFill>
+            <a:blip r:embed="rId4">
+              <a:extLst>
+                <a:ext uri="{BEBA8EAE-BF5A-486C-A8C5-ECC9F3942E4B}">
+                  <a14:imgProps xmlns:a14="http://schemas.microsoft.com/office/drawing/2010/main">
+                    <a14:imgLayer r:embed="rId5">
+                      <a14:imgEffect>
+                        <a14:sharpenSoften amount="-50000"/>
+                      </a14:imgEffect>
+                    </a14:imgLayer>
+                  </a14:imgProps>
+                </a:ext>
+              </a:extLst>
+            </a:blip>
+            <a:stretch>
+              <a:fillRect/>
+            </a:stretch>
+          </p:blipFill>
+          <p:spPr>
+            <a:xfrm>
+              <a:off x="1106062" y="3019069"/>
+              <a:ext cx="5591679" cy="1799541"/>
+            </a:xfrm>
+            <a:prstGeom prst="rect">
+              <a:avLst/>
+            </a:prstGeom>
+          </p:spPr>
+        </p:pic>
+        <p:sp>
+          <p:nvSpPr>
+            <p:cNvPr id="5" name="Rectangle 4">
+              <a:extLst>
+                <a:ext uri="{FF2B5EF4-FFF2-40B4-BE49-F238E27FC236}">
+                  <a16:creationId xmlns:a16="http://schemas.microsoft.com/office/drawing/2014/main" id="{9620C045-52C6-1B43-B402-C123826A9E88}"/>
+                </a:ext>
+              </a:extLst>
+            </p:cNvPr>
+            <p:cNvSpPr/>
+            <p:nvPr/>
+          </p:nvSpPr>
+          <p:spPr>
+            <a:xfrm>
+              <a:off x="3104402" y="1377918"/>
+              <a:ext cx="3752193" cy="617498"/>
+            </a:xfrm>
+            <a:prstGeom prst="rect">
+              <a:avLst/>
+            </a:prstGeom>
+            <a:solidFill>
+              <a:schemeClr val="bg1"/>
+            </a:solidFill>
+            <a:ln>
+              <a:noFill/>
+            </a:ln>
+          </p:spPr>
+          <p:style>
+            <a:lnRef idx="2">
+              <a:schemeClr val="accent1">
+                <a:shade val="50000"/>
+              </a:schemeClr>
+            </a:lnRef>
+            <a:fillRef idx="1">
+              <a:schemeClr val="accent1"/>
+            </a:fillRef>
+            <a:effectRef idx="0">
+              <a:schemeClr val="accent1"/>
+            </a:effectRef>
+            <a:fontRef idx="minor">
+              <a:schemeClr val="lt1"/>
+            </a:fontRef>
+          </p:style>
+          <p:txBody>
+            <a:bodyPr rtlCol="0" anchor="ctr"/>
+            <a:lstStyle/>
+            <a:p>
+              <a:pPr algn="ctr"/>
+              <a:endParaRPr lang="en-GB"/>
+            </a:p>
+          </p:txBody>
+        </p:sp>
       </p:grpSp>
-      <p:sp>
-        <p:nvSpPr>
-          <p:cNvPr id="3" name="Slide Number Placeholder 2">
-            <a:extLst>
-              <a:ext uri="{FF2B5EF4-FFF2-40B4-BE49-F238E27FC236}">
-                <a16:creationId xmlns:a16="http://schemas.microsoft.com/office/drawing/2014/main" id="{1BFB2962-CC64-BE41-84A9-4FEB2C6D04D0}"/>
-              </a:ext>
-            </a:extLst>
-          </p:cNvPr>
-          <p:cNvSpPr>
-            <a:spLocks noGrp="1"/>
-          </p:cNvSpPr>
-          <p:nvPr>
-            <p:ph type="sldNum" sz="quarter" idx="12"/>
-          </p:nvPr>
-        </p:nvSpPr>
-        <p:spPr/>
-        <p:txBody>
-          <a:bodyPr/>
-          <a:lstStyle/>
-          <a:p>
-            <a:fld id="{B92EE303-D650-3345-864C-D476979F360C}" type="slidenum">
-              <a:rPr lang="sv-SE"/>
-              <a:t>3</a:t>
-            </a:fld>
-            <a:endParaRPr lang="sv-SE"/>
-          </a:p>
-        </p:txBody>
-      </p:sp>
     </p:spTree>
     <p:extLst>
       <p:ext uri="{BB962C8B-B14F-4D97-AF65-F5344CB8AC3E}">
-        <p14:creationId xmlns:p14="http://schemas.microsoft.com/office/powerpoint/2010/main" val="3614252548"/>
+        <p14:creationId xmlns:p14="http://schemas.microsoft.com/office/powerpoint/2010/main" val="2907979186"/>
       </p:ext>
     </p:extLst>
   </p:cSld>
@@ -5362,127 +5363,6 @@
           </a:ln>
         </p:spPr>
       </p:pic>
-      <p:pic>
-        <p:nvPicPr>
-          <p:cNvPr id="5" name="Picture 4">
-            <a:extLst>
-              <a:ext uri="{FF2B5EF4-FFF2-40B4-BE49-F238E27FC236}">
-                <a16:creationId xmlns:a16="http://schemas.microsoft.com/office/drawing/2014/main" id="{91515740-27B7-3F46-90B8-B4AE20552068}"/>
-              </a:ext>
-            </a:extLst>
-          </p:cNvPr>
-          <p:cNvPicPr>
-            <a:picLocks noChangeAspect="1"/>
-          </p:cNvPicPr>
-          <p:nvPr/>
-        </p:nvPicPr>
-        <p:blipFill>
-          <a:blip r:embed="rId3"/>
-          <a:stretch>
-            <a:fillRect/>
-          </a:stretch>
-        </p:blipFill>
-        <p:spPr>
-          <a:xfrm>
-            <a:off x="5807566" y="3210832"/>
-            <a:ext cx="1091045" cy="268432"/>
-          </a:xfrm>
-          <a:prstGeom prst="rect">
-            <a:avLst/>
-          </a:prstGeom>
-        </p:spPr>
-      </p:pic>
-      <p:cxnSp>
-        <p:nvCxnSpPr>
-          <p:cNvPr id="6" name="Straight Arrow Connector 5">
-            <a:extLst>
-              <a:ext uri="{FF2B5EF4-FFF2-40B4-BE49-F238E27FC236}">
-                <a16:creationId xmlns:a16="http://schemas.microsoft.com/office/drawing/2014/main" id="{2356CEE5-369D-9345-9663-E1C752DB329F}"/>
-              </a:ext>
-            </a:extLst>
-          </p:cNvPr>
-          <p:cNvCxnSpPr>
-            <a:cxnSpLocks/>
-          </p:cNvCxnSpPr>
-          <p:nvPr/>
-        </p:nvCxnSpPr>
-        <p:spPr>
-          <a:xfrm flipH="1">
-            <a:off x="368539" y="2337011"/>
-            <a:ext cx="471340" cy="0"/>
-          </a:xfrm>
-          <a:prstGeom prst="straightConnector1">
-            <a:avLst/>
-          </a:prstGeom>
-          <a:ln w="57150">
-            <a:solidFill>
-              <a:schemeClr val="accent2"/>
-            </a:solidFill>
-            <a:tailEnd type="triangle"/>
-          </a:ln>
-        </p:spPr>
-        <p:style>
-          <a:lnRef idx="1">
-            <a:schemeClr val="accent1"/>
-          </a:lnRef>
-          <a:fillRef idx="0">
-            <a:schemeClr val="accent1"/>
-          </a:fillRef>
-          <a:effectRef idx="0">
-            <a:schemeClr val="accent1"/>
-          </a:effectRef>
-          <a:fontRef idx="minor">
-            <a:schemeClr val="tx1"/>
-          </a:fontRef>
-        </p:style>
-      </p:cxnSp>
-      <p:sp>
-        <p:nvSpPr>
-          <p:cNvPr id="7" name="Rectangle: Rounded Corners 8">
-            <a:extLst>
-              <a:ext uri="{FF2B5EF4-FFF2-40B4-BE49-F238E27FC236}">
-                <a16:creationId xmlns:a16="http://schemas.microsoft.com/office/drawing/2014/main" id="{42045E00-2D2D-F94E-9473-4A58DA740532}"/>
-              </a:ext>
-            </a:extLst>
-          </p:cNvPr>
-          <p:cNvSpPr/>
-          <p:nvPr/>
-        </p:nvSpPr>
-        <p:spPr>
-          <a:xfrm>
-            <a:off x="910590" y="2206397"/>
-            <a:ext cx="901930" cy="270423"/>
-          </a:xfrm>
-          <a:prstGeom prst="roundRect">
-            <a:avLst/>
-          </a:prstGeom>
-        </p:spPr>
-        <p:style>
-          <a:lnRef idx="0">
-            <a:schemeClr val="accent2"/>
-          </a:lnRef>
-          <a:fillRef idx="3">
-            <a:schemeClr val="accent2"/>
-          </a:fillRef>
-          <a:effectRef idx="3">
-            <a:schemeClr val="accent2"/>
-          </a:effectRef>
-          <a:fontRef idx="minor">
-            <a:schemeClr val="lt1"/>
-          </a:fontRef>
-        </p:style>
-        <p:txBody>
-          <a:bodyPr rtlCol="0" anchor="ctr"/>
-          <a:lstStyle/>
-          <a:p>
-            <a:pPr algn="ctr"/>
-            <a:r>
-              <a:rPr lang="sv-SE" dirty="0"/>
-              <a:t>Click</a:t>
-            </a:r>
-          </a:p>
-        </p:txBody>
-      </p:sp>
       <p:grpSp>
         <p:nvGrpSpPr>
           <p:cNvPr id="8" name="Group 7">
@@ -5553,7 +5433,7 @@
             <p:nvPr/>
           </p:nvPicPr>
           <p:blipFill>
-            <a:blip r:embed="rId4"/>
+            <a:blip r:embed="rId3"/>
             <a:stretch>
               <a:fillRect/>
             </a:stretch>
@@ -5619,7 +5499,7 @@
           <p:nvPr/>
         </p:nvPicPr>
         <p:blipFill>
-          <a:blip r:embed="rId5"/>
+          <a:blip r:embed="rId4"/>
           <a:stretch>
             <a:fillRect/>
           </a:stretch>
@@ -5649,7 +5529,7 @@
           <p:nvPr/>
         </p:nvPicPr>
         <p:blipFill>
-          <a:blip r:embed="rId5"/>
+          <a:blip r:embed="rId4"/>
           <a:stretch>
             <a:fillRect/>
           </a:stretch>
@@ -5693,6 +5573,419 @@
           </a:p>
         </p:txBody>
       </p:sp>
+      <p:pic>
+        <p:nvPicPr>
+          <p:cNvPr id="15" name="Picture 14">
+            <a:extLst>
+              <a:ext uri="{FF2B5EF4-FFF2-40B4-BE49-F238E27FC236}">
+                <a16:creationId xmlns:a16="http://schemas.microsoft.com/office/drawing/2014/main" id="{C741765A-7D42-514A-AC23-1839260B85B4}"/>
+              </a:ext>
+            </a:extLst>
+          </p:cNvPr>
+          <p:cNvPicPr>
+            <a:picLocks noChangeAspect="1"/>
+          </p:cNvPicPr>
+          <p:nvPr/>
+        </p:nvPicPr>
+        <p:blipFill>
+          <a:blip r:embed="rId5">
+            <a:extLst>
+              <a:ext uri="{BEBA8EAE-BF5A-486C-A8C5-ECC9F3942E4B}">
+                <a14:imgProps xmlns:a14="http://schemas.microsoft.com/office/drawing/2010/main">
+                  <a14:imgLayer r:embed="rId6">
+                    <a14:imgEffect>
+                      <a14:sharpenSoften amount="-50000"/>
+                    </a14:imgEffect>
+                  </a14:imgLayer>
+                </a14:imgProps>
+              </a:ext>
+            </a:extLst>
+          </a:blip>
+          <a:stretch>
+            <a:fillRect/>
+          </a:stretch>
+        </p:blipFill>
+        <p:spPr>
+          <a:xfrm>
+            <a:off x="344182" y="3222871"/>
+            <a:ext cx="3156358" cy="1015795"/>
+          </a:xfrm>
+          <a:prstGeom prst="rect">
+            <a:avLst/>
+          </a:prstGeom>
+        </p:spPr>
+      </p:pic>
+      <p:sp>
+        <p:nvSpPr>
+          <p:cNvPr id="16" name="Rectangle 15">
+            <a:extLst>
+              <a:ext uri="{FF2B5EF4-FFF2-40B4-BE49-F238E27FC236}">
+                <a16:creationId xmlns:a16="http://schemas.microsoft.com/office/drawing/2014/main" id="{43A198EC-D824-E643-9042-8A02E4A4C47C}"/>
+              </a:ext>
+            </a:extLst>
+          </p:cNvPr>
+          <p:cNvSpPr/>
+          <p:nvPr/>
+        </p:nvSpPr>
+        <p:spPr>
+          <a:xfrm>
+            <a:off x="999211" y="2236952"/>
+            <a:ext cx="2562798" cy="617498"/>
+          </a:xfrm>
+          <a:prstGeom prst="rect">
+            <a:avLst/>
+          </a:prstGeom>
+          <a:solidFill>
+            <a:schemeClr val="bg1"/>
+          </a:solidFill>
+          <a:ln>
+            <a:noFill/>
+          </a:ln>
+        </p:spPr>
+        <p:style>
+          <a:lnRef idx="2">
+            <a:schemeClr val="accent1">
+              <a:shade val="50000"/>
+            </a:schemeClr>
+          </a:lnRef>
+          <a:fillRef idx="1">
+            <a:schemeClr val="accent1"/>
+          </a:fillRef>
+          <a:effectRef idx="0">
+            <a:schemeClr val="accent1"/>
+          </a:effectRef>
+          <a:fontRef idx="minor">
+            <a:schemeClr val="lt1"/>
+          </a:fontRef>
+        </p:style>
+        <p:txBody>
+          <a:bodyPr rtlCol="0" anchor="ctr"/>
+          <a:lstStyle/>
+          <a:p>
+            <a:pPr algn="ctr"/>
+            <a:endParaRPr lang="en-GB"/>
+          </a:p>
+        </p:txBody>
+      </p:sp>
+      <p:cxnSp>
+        <p:nvCxnSpPr>
+          <p:cNvPr id="6" name="Straight Arrow Connector 5">
+            <a:extLst>
+              <a:ext uri="{FF2B5EF4-FFF2-40B4-BE49-F238E27FC236}">
+                <a16:creationId xmlns:a16="http://schemas.microsoft.com/office/drawing/2014/main" id="{2356CEE5-369D-9345-9663-E1C752DB329F}"/>
+              </a:ext>
+            </a:extLst>
+          </p:cNvPr>
+          <p:cNvCxnSpPr>
+            <a:cxnSpLocks/>
+          </p:cNvCxnSpPr>
+          <p:nvPr/>
+        </p:nvCxnSpPr>
+        <p:spPr>
+          <a:xfrm flipH="1">
+            <a:off x="368539" y="2337011"/>
+            <a:ext cx="471340" cy="0"/>
+          </a:xfrm>
+          <a:prstGeom prst="straightConnector1">
+            <a:avLst/>
+          </a:prstGeom>
+          <a:ln w="57150">
+            <a:solidFill>
+              <a:schemeClr val="accent2"/>
+            </a:solidFill>
+            <a:tailEnd type="triangle"/>
+          </a:ln>
+        </p:spPr>
+        <p:style>
+          <a:lnRef idx="1">
+            <a:schemeClr val="accent1"/>
+          </a:lnRef>
+          <a:fillRef idx="0">
+            <a:schemeClr val="accent1"/>
+          </a:fillRef>
+          <a:effectRef idx="0">
+            <a:schemeClr val="accent1"/>
+          </a:effectRef>
+          <a:fontRef idx="minor">
+            <a:schemeClr val="tx1"/>
+          </a:fontRef>
+        </p:style>
+      </p:cxnSp>
+      <p:sp>
+        <p:nvSpPr>
+          <p:cNvPr id="7" name="Rectangle: Rounded Corners 8">
+            <a:extLst>
+              <a:ext uri="{FF2B5EF4-FFF2-40B4-BE49-F238E27FC236}">
+                <a16:creationId xmlns:a16="http://schemas.microsoft.com/office/drawing/2014/main" id="{42045E00-2D2D-F94E-9473-4A58DA740532}"/>
+              </a:ext>
+            </a:extLst>
+          </p:cNvPr>
+          <p:cNvSpPr/>
+          <p:nvPr/>
+        </p:nvSpPr>
+        <p:spPr>
+          <a:xfrm>
+            <a:off x="910590" y="2206397"/>
+            <a:ext cx="901930" cy="270423"/>
+          </a:xfrm>
+          <a:prstGeom prst="roundRect">
+            <a:avLst/>
+          </a:prstGeom>
+        </p:spPr>
+        <p:style>
+          <a:lnRef idx="0">
+            <a:schemeClr val="accent2"/>
+          </a:lnRef>
+          <a:fillRef idx="3">
+            <a:schemeClr val="accent2"/>
+          </a:fillRef>
+          <a:effectRef idx="3">
+            <a:schemeClr val="accent2"/>
+          </a:effectRef>
+          <a:fontRef idx="minor">
+            <a:schemeClr val="lt1"/>
+          </a:fontRef>
+        </p:style>
+        <p:txBody>
+          <a:bodyPr rtlCol="0" anchor="ctr"/>
+          <a:lstStyle/>
+          <a:p>
+            <a:pPr algn="ctr"/>
+            <a:r>
+              <a:rPr lang="sv-SE" dirty="0"/>
+              <a:t>Click</a:t>
+            </a:r>
+          </a:p>
+        </p:txBody>
+      </p:sp>
+      <p:sp>
+        <p:nvSpPr>
+          <p:cNvPr id="17" name="Rectangle 16">
+            <a:extLst>
+              <a:ext uri="{FF2B5EF4-FFF2-40B4-BE49-F238E27FC236}">
+                <a16:creationId xmlns:a16="http://schemas.microsoft.com/office/drawing/2014/main" id="{C11A6177-A88D-6C47-A505-E0A1531A5152}"/>
+              </a:ext>
+            </a:extLst>
+          </p:cNvPr>
+          <p:cNvSpPr/>
+          <p:nvPr/>
+        </p:nvSpPr>
+        <p:spPr>
+          <a:xfrm>
+            <a:off x="292127" y="4223467"/>
+            <a:ext cx="3227841" cy="761249"/>
+          </a:xfrm>
+          <a:prstGeom prst="rect">
+            <a:avLst/>
+          </a:prstGeom>
+          <a:solidFill>
+            <a:schemeClr val="bg1"/>
+          </a:solidFill>
+          <a:ln>
+            <a:noFill/>
+          </a:ln>
+        </p:spPr>
+        <p:style>
+          <a:lnRef idx="2">
+            <a:schemeClr val="accent1">
+              <a:shade val="50000"/>
+            </a:schemeClr>
+          </a:lnRef>
+          <a:fillRef idx="1">
+            <a:schemeClr val="accent1"/>
+          </a:fillRef>
+          <a:effectRef idx="0">
+            <a:schemeClr val="accent1"/>
+          </a:effectRef>
+          <a:fontRef idx="minor">
+            <a:schemeClr val="lt1"/>
+          </a:fontRef>
+        </p:style>
+        <p:txBody>
+          <a:bodyPr rtlCol="0" anchor="ctr"/>
+          <a:lstStyle/>
+          <a:p>
+            <a:pPr algn="ctr"/>
+            <a:endParaRPr lang="en-GB"/>
+          </a:p>
+        </p:txBody>
+      </p:sp>
+      <p:sp>
+        <p:nvSpPr>
+          <p:cNvPr id="18" name="Rectangle 17">
+            <a:extLst>
+              <a:ext uri="{FF2B5EF4-FFF2-40B4-BE49-F238E27FC236}">
+                <a16:creationId xmlns:a16="http://schemas.microsoft.com/office/drawing/2014/main" id="{8C4DEED0-B0EE-D148-A2ED-D43FC35BB9E9}"/>
+              </a:ext>
+            </a:extLst>
+          </p:cNvPr>
+          <p:cNvSpPr/>
+          <p:nvPr/>
+        </p:nvSpPr>
+        <p:spPr>
+          <a:xfrm>
+            <a:off x="5960169" y="2264996"/>
+            <a:ext cx="2562798" cy="617498"/>
+          </a:xfrm>
+          <a:prstGeom prst="rect">
+            <a:avLst/>
+          </a:prstGeom>
+          <a:solidFill>
+            <a:schemeClr val="bg1"/>
+          </a:solidFill>
+          <a:ln>
+            <a:noFill/>
+          </a:ln>
+        </p:spPr>
+        <p:style>
+          <a:lnRef idx="2">
+            <a:schemeClr val="accent1">
+              <a:shade val="50000"/>
+            </a:schemeClr>
+          </a:lnRef>
+          <a:fillRef idx="1">
+            <a:schemeClr val="accent1"/>
+          </a:fillRef>
+          <a:effectRef idx="0">
+            <a:schemeClr val="accent1"/>
+          </a:effectRef>
+          <a:fontRef idx="minor">
+            <a:schemeClr val="lt1"/>
+          </a:fontRef>
+        </p:style>
+        <p:txBody>
+          <a:bodyPr rtlCol="0" anchor="ctr"/>
+          <a:lstStyle/>
+          <a:p>
+            <a:pPr algn="ctr"/>
+            <a:endParaRPr lang="en-GB"/>
+          </a:p>
+        </p:txBody>
+      </p:sp>
+      <p:sp>
+        <p:nvSpPr>
+          <p:cNvPr id="19" name="Rectangle 18">
+            <a:extLst>
+              <a:ext uri="{FF2B5EF4-FFF2-40B4-BE49-F238E27FC236}">
+                <a16:creationId xmlns:a16="http://schemas.microsoft.com/office/drawing/2014/main" id="{CE67E63E-5E46-AF4E-BDF1-7FD2AEF4EA41}"/>
+              </a:ext>
+            </a:extLst>
+          </p:cNvPr>
+          <p:cNvSpPr/>
+          <p:nvPr/>
+        </p:nvSpPr>
+        <p:spPr>
+          <a:xfrm>
+            <a:off x="5253085" y="4251511"/>
+            <a:ext cx="3227841" cy="761249"/>
+          </a:xfrm>
+          <a:prstGeom prst="rect">
+            <a:avLst/>
+          </a:prstGeom>
+          <a:solidFill>
+            <a:schemeClr val="bg1"/>
+          </a:solidFill>
+          <a:ln>
+            <a:noFill/>
+          </a:ln>
+        </p:spPr>
+        <p:style>
+          <a:lnRef idx="2">
+            <a:schemeClr val="accent1">
+              <a:shade val="50000"/>
+            </a:schemeClr>
+          </a:lnRef>
+          <a:fillRef idx="1">
+            <a:schemeClr val="accent1"/>
+          </a:fillRef>
+          <a:effectRef idx="0">
+            <a:schemeClr val="accent1"/>
+          </a:effectRef>
+          <a:fontRef idx="minor">
+            <a:schemeClr val="lt1"/>
+          </a:fontRef>
+        </p:style>
+        <p:txBody>
+          <a:bodyPr rtlCol="0" anchor="ctr"/>
+          <a:lstStyle/>
+          <a:p>
+            <a:pPr algn="ctr"/>
+            <a:endParaRPr lang="en-GB"/>
+          </a:p>
+        </p:txBody>
+      </p:sp>
+      <p:pic>
+        <p:nvPicPr>
+          <p:cNvPr id="20" name="Picture 19">
+            <a:extLst>
+              <a:ext uri="{FF2B5EF4-FFF2-40B4-BE49-F238E27FC236}">
+                <a16:creationId xmlns:a16="http://schemas.microsoft.com/office/drawing/2014/main" id="{94761C00-760D-C84C-AB7D-51EB130BEB5A}"/>
+              </a:ext>
+            </a:extLst>
+          </p:cNvPr>
+          <p:cNvPicPr>
+            <a:picLocks noChangeAspect="1"/>
+          </p:cNvPicPr>
+          <p:nvPr/>
+        </p:nvPicPr>
+        <p:blipFill>
+          <a:blip r:embed="rId5">
+            <a:extLst>
+              <a:ext uri="{BEBA8EAE-BF5A-486C-A8C5-ECC9F3942E4B}">
+                <a14:imgProps xmlns:a14="http://schemas.microsoft.com/office/drawing/2010/main">
+                  <a14:imgLayer r:embed="rId7">
+                    <a14:imgEffect>
+                      <a14:sharpenSoften amount="-50000"/>
+                    </a14:imgEffect>
+                  </a14:imgLayer>
+                </a14:imgProps>
+              </a:ext>
+            </a:extLst>
+          </a:blip>
+          <a:stretch>
+            <a:fillRect/>
+          </a:stretch>
+        </p:blipFill>
+        <p:spPr>
+          <a:xfrm>
+            <a:off x="5282757" y="3041326"/>
+            <a:ext cx="3156358" cy="1015795"/>
+          </a:xfrm>
+          <a:prstGeom prst="rect">
+            <a:avLst/>
+          </a:prstGeom>
+        </p:spPr>
+      </p:pic>
+      <p:pic>
+        <p:nvPicPr>
+          <p:cNvPr id="5" name="Picture 4">
+            <a:extLst>
+              <a:ext uri="{FF2B5EF4-FFF2-40B4-BE49-F238E27FC236}">
+                <a16:creationId xmlns:a16="http://schemas.microsoft.com/office/drawing/2014/main" id="{91515740-27B7-3F46-90B8-B4AE20552068}"/>
+              </a:ext>
+            </a:extLst>
+          </p:cNvPr>
+          <p:cNvPicPr>
+            <a:picLocks noChangeAspect="1"/>
+          </p:cNvPicPr>
+          <p:nvPr/>
+        </p:nvPicPr>
+        <p:blipFill>
+          <a:blip r:embed="rId8"/>
+          <a:stretch>
+            <a:fillRect/>
+          </a:stretch>
+        </p:blipFill>
+        <p:spPr>
+          <a:xfrm>
+            <a:off x="5833398" y="2720234"/>
+            <a:ext cx="1091045" cy="268432"/>
+          </a:xfrm>
+          <a:prstGeom prst="rect">
+            <a:avLst/>
+          </a:prstGeom>
+        </p:spPr>
+      </p:pic>
     </p:spTree>
     <p:extLst>
       <p:ext uri="{BB962C8B-B14F-4D97-AF65-F5344CB8AC3E}">
@@ -6587,6 +6880,318 @@
               <a:t>6</a:t>
             </a:fld>
             <a:endParaRPr lang="sv-SE"/>
+          </a:p>
+        </p:txBody>
+      </p:sp>
+      <p:sp>
+        <p:nvSpPr>
+          <p:cNvPr id="25" name="Rectangle 24">
+            <a:extLst>
+              <a:ext uri="{FF2B5EF4-FFF2-40B4-BE49-F238E27FC236}">
+                <a16:creationId xmlns:a16="http://schemas.microsoft.com/office/drawing/2014/main" id="{625BE069-CE4C-6A45-B420-57367D81A412}"/>
+              </a:ext>
+            </a:extLst>
+          </p:cNvPr>
+          <p:cNvSpPr/>
+          <p:nvPr/>
+        </p:nvSpPr>
+        <p:spPr>
+          <a:xfrm>
+            <a:off x="1286212" y="1682805"/>
+            <a:ext cx="2118015" cy="463935"/>
+          </a:xfrm>
+          <a:prstGeom prst="rect">
+            <a:avLst/>
+          </a:prstGeom>
+          <a:solidFill>
+            <a:schemeClr val="bg1"/>
+          </a:solidFill>
+          <a:ln>
+            <a:noFill/>
+          </a:ln>
+        </p:spPr>
+        <p:style>
+          <a:lnRef idx="2">
+            <a:schemeClr val="accent1">
+              <a:shade val="50000"/>
+            </a:schemeClr>
+          </a:lnRef>
+          <a:fillRef idx="1">
+            <a:schemeClr val="accent1"/>
+          </a:fillRef>
+          <a:effectRef idx="0">
+            <a:schemeClr val="accent1"/>
+          </a:effectRef>
+          <a:fontRef idx="minor">
+            <a:schemeClr val="lt1"/>
+          </a:fontRef>
+        </p:style>
+        <p:txBody>
+          <a:bodyPr rtlCol="0" anchor="ctr"/>
+          <a:lstStyle/>
+          <a:p>
+            <a:pPr algn="ctr"/>
+            <a:endParaRPr lang="en-GB"/>
+          </a:p>
+        </p:txBody>
+      </p:sp>
+      <p:sp>
+        <p:nvSpPr>
+          <p:cNvPr id="26" name="Rectangle 25">
+            <a:extLst>
+              <a:ext uri="{FF2B5EF4-FFF2-40B4-BE49-F238E27FC236}">
+                <a16:creationId xmlns:a16="http://schemas.microsoft.com/office/drawing/2014/main" id="{BF62A04C-0F6F-E34E-B806-50989045C0B2}"/>
+              </a:ext>
+            </a:extLst>
+          </p:cNvPr>
+          <p:cNvSpPr/>
+          <p:nvPr/>
+        </p:nvSpPr>
+        <p:spPr>
+          <a:xfrm>
+            <a:off x="599265" y="3132314"/>
+            <a:ext cx="2667637" cy="915899"/>
+          </a:xfrm>
+          <a:prstGeom prst="rect">
+            <a:avLst/>
+          </a:prstGeom>
+          <a:solidFill>
+            <a:schemeClr val="bg1"/>
+          </a:solidFill>
+          <a:ln>
+            <a:noFill/>
+          </a:ln>
+        </p:spPr>
+        <p:style>
+          <a:lnRef idx="2">
+            <a:schemeClr val="accent1">
+              <a:shade val="50000"/>
+            </a:schemeClr>
+          </a:lnRef>
+          <a:fillRef idx="1">
+            <a:schemeClr val="accent1"/>
+          </a:fillRef>
+          <a:effectRef idx="0">
+            <a:schemeClr val="accent1"/>
+          </a:effectRef>
+          <a:fontRef idx="minor">
+            <a:schemeClr val="lt1"/>
+          </a:fontRef>
+        </p:style>
+        <p:txBody>
+          <a:bodyPr rtlCol="0" anchor="ctr"/>
+          <a:lstStyle/>
+          <a:p>
+            <a:pPr algn="ctr"/>
+            <a:endParaRPr lang="en-GB"/>
+          </a:p>
+        </p:txBody>
+      </p:sp>
+      <p:sp>
+        <p:nvSpPr>
+          <p:cNvPr id="27" name="Rectangle 26">
+            <a:extLst>
+              <a:ext uri="{FF2B5EF4-FFF2-40B4-BE49-F238E27FC236}">
+                <a16:creationId xmlns:a16="http://schemas.microsoft.com/office/drawing/2014/main" id="{47DC7DFB-6E24-F641-A2A6-A659808EEAB3}"/>
+              </a:ext>
+            </a:extLst>
+          </p:cNvPr>
+          <p:cNvSpPr/>
+          <p:nvPr/>
+        </p:nvSpPr>
+        <p:spPr>
+          <a:xfrm>
+            <a:off x="5072541" y="3001911"/>
+            <a:ext cx="2857882" cy="1083900"/>
+          </a:xfrm>
+          <a:prstGeom prst="rect">
+            <a:avLst/>
+          </a:prstGeom>
+          <a:solidFill>
+            <a:schemeClr val="bg1"/>
+          </a:solidFill>
+          <a:ln>
+            <a:noFill/>
+          </a:ln>
+        </p:spPr>
+        <p:style>
+          <a:lnRef idx="2">
+            <a:schemeClr val="accent1">
+              <a:shade val="50000"/>
+            </a:schemeClr>
+          </a:lnRef>
+          <a:fillRef idx="1">
+            <a:schemeClr val="accent1"/>
+          </a:fillRef>
+          <a:effectRef idx="0">
+            <a:schemeClr val="accent1"/>
+          </a:effectRef>
+          <a:fontRef idx="minor">
+            <a:schemeClr val="lt1"/>
+          </a:fontRef>
+        </p:style>
+        <p:txBody>
+          <a:bodyPr rtlCol="0" anchor="ctr"/>
+          <a:lstStyle/>
+          <a:p>
+            <a:pPr algn="ctr"/>
+            <a:endParaRPr lang="en-GB"/>
+          </a:p>
+        </p:txBody>
+      </p:sp>
+      <p:sp>
+        <p:nvSpPr>
+          <p:cNvPr id="28" name="Rectangle 27">
+            <a:extLst>
+              <a:ext uri="{FF2B5EF4-FFF2-40B4-BE49-F238E27FC236}">
+                <a16:creationId xmlns:a16="http://schemas.microsoft.com/office/drawing/2014/main" id="{9B4C8750-6737-E745-949B-439E99EC0ADD}"/>
+              </a:ext>
+            </a:extLst>
+          </p:cNvPr>
+          <p:cNvSpPr/>
+          <p:nvPr/>
+        </p:nvSpPr>
+        <p:spPr>
+          <a:xfrm>
+            <a:off x="6232576" y="1620902"/>
+            <a:ext cx="1656393" cy="353119"/>
+          </a:xfrm>
+          <a:prstGeom prst="rect">
+            <a:avLst/>
+          </a:prstGeom>
+          <a:solidFill>
+            <a:schemeClr val="bg1"/>
+          </a:solidFill>
+          <a:ln>
+            <a:noFill/>
+          </a:ln>
+        </p:spPr>
+        <p:style>
+          <a:lnRef idx="2">
+            <a:schemeClr val="accent1">
+              <a:shade val="50000"/>
+            </a:schemeClr>
+          </a:lnRef>
+          <a:fillRef idx="1">
+            <a:schemeClr val="accent1"/>
+          </a:fillRef>
+          <a:effectRef idx="0">
+            <a:schemeClr val="accent1"/>
+          </a:effectRef>
+          <a:fontRef idx="minor">
+            <a:schemeClr val="lt1"/>
+          </a:fontRef>
+        </p:style>
+        <p:txBody>
+          <a:bodyPr rtlCol="0" anchor="ctr"/>
+          <a:lstStyle/>
+          <a:p>
+            <a:pPr algn="ctr"/>
+            <a:endParaRPr lang="en-GB"/>
+          </a:p>
+        </p:txBody>
+      </p:sp>
+      <p:sp>
+        <p:nvSpPr>
+          <p:cNvPr id="29" name="Rectangle 28">
+            <a:extLst>
+              <a:ext uri="{FF2B5EF4-FFF2-40B4-BE49-F238E27FC236}">
+                <a16:creationId xmlns:a16="http://schemas.microsoft.com/office/drawing/2014/main" id="{907E7CA4-3620-3646-ACDC-47FB40AAEC16}"/>
+              </a:ext>
+            </a:extLst>
+          </p:cNvPr>
+          <p:cNvSpPr/>
+          <p:nvPr/>
+        </p:nvSpPr>
+        <p:spPr>
+          <a:xfrm>
+            <a:off x="6211612" y="4908164"/>
+            <a:ext cx="1796267" cy="353119"/>
+          </a:xfrm>
+          <a:prstGeom prst="rect">
+            <a:avLst/>
+          </a:prstGeom>
+          <a:solidFill>
+            <a:schemeClr val="bg1"/>
+          </a:solidFill>
+          <a:ln>
+            <a:noFill/>
+          </a:ln>
+        </p:spPr>
+        <p:style>
+          <a:lnRef idx="2">
+            <a:schemeClr val="accent1">
+              <a:shade val="50000"/>
+            </a:schemeClr>
+          </a:lnRef>
+          <a:fillRef idx="1">
+            <a:schemeClr val="accent1"/>
+          </a:fillRef>
+          <a:effectRef idx="0">
+            <a:schemeClr val="accent1"/>
+          </a:effectRef>
+          <a:fontRef idx="minor">
+            <a:schemeClr val="lt1"/>
+          </a:fontRef>
+        </p:style>
+        <p:txBody>
+          <a:bodyPr rtlCol="0" anchor="ctr"/>
+          <a:lstStyle/>
+          <a:p>
+            <a:pPr algn="ctr"/>
+            <a:endParaRPr lang="en-GB"/>
+          </a:p>
+        </p:txBody>
+      </p:sp>
+      <p:sp>
+        <p:nvSpPr>
+          <p:cNvPr id="30" name="Rectangle 29">
+            <a:extLst>
+              <a:ext uri="{FF2B5EF4-FFF2-40B4-BE49-F238E27FC236}">
+                <a16:creationId xmlns:a16="http://schemas.microsoft.com/office/drawing/2014/main" id="{BCF46ED6-B7F8-A746-9896-5AE4BAA09543}"/>
+              </a:ext>
+            </a:extLst>
+          </p:cNvPr>
+          <p:cNvSpPr/>
+          <p:nvPr/>
+        </p:nvSpPr>
+        <p:spPr>
+          <a:xfrm>
+            <a:off x="5194172" y="5850095"/>
+            <a:ext cx="2736251" cy="642777"/>
+          </a:xfrm>
+          <a:prstGeom prst="rect">
+            <a:avLst/>
+          </a:prstGeom>
+          <a:solidFill>
+            <a:schemeClr val="bg1"/>
+          </a:solidFill>
+          <a:ln>
+            <a:noFill/>
+          </a:ln>
+        </p:spPr>
+        <p:style>
+          <a:lnRef idx="2">
+            <a:schemeClr val="accent1">
+              <a:shade val="50000"/>
+            </a:schemeClr>
+          </a:lnRef>
+          <a:fillRef idx="1">
+            <a:schemeClr val="accent1"/>
+          </a:fillRef>
+          <a:effectRef idx="0">
+            <a:schemeClr val="accent1"/>
+          </a:effectRef>
+          <a:fontRef idx="minor">
+            <a:schemeClr val="lt1"/>
+          </a:fontRef>
+        </p:style>
+        <p:txBody>
+          <a:bodyPr rtlCol="0" anchor="ctr"/>
+          <a:lstStyle/>
+          <a:p>
+            <a:pPr algn="ctr"/>
+            <a:endParaRPr lang="en-GB"/>
           </a:p>
         </p:txBody>
       </p:sp>

</xml_diff>

<commit_message>
updates prior to pulls to servers
</commit_message>
<xml_diff>
--- a/CSS2019/doc/GraphEditor introduction.pptx
+++ b/CSS2019/doc/GraphEditor introduction.pptx
@@ -206,7 +206,7 @@
           </a:lstStyle>
           <a:p>
             <a:fld id="{40874CF6-D45C-5744-8556-A75C8F417754}" type="datetimeFigureOut">
-              <a:t>2019-05-23</a:t>
+              <a:t>6/5/2019</a:t>
             </a:fld>
             <a:endParaRPr lang="sv-SE"/>
           </a:p>
@@ -684,7 +684,7 @@
           <a:lstStyle/>
           <a:p>
             <a:fld id="{8C5B0BAF-7654-EA40-A022-F46B0B5A6508}" type="datetime1">
-              <a:t>2019-05-23</a:t>
+              <a:t>6/5/2019</a:t>
             </a:fld>
             <a:endParaRPr lang="sv-SE"/>
           </a:p>
@@ -850,7 +850,7 @@
           <a:lstStyle/>
           <a:p>
             <a:fld id="{0F7A66E6-6089-9F41-B6ED-B82A14365DAD}" type="datetime1">
-              <a:t>2019-05-23</a:t>
+              <a:t>6/5/2019</a:t>
             </a:fld>
             <a:endParaRPr lang="sv-SE"/>
           </a:p>
@@ -1091,7 +1091,7 @@
           <a:lstStyle/>
           <a:p>
             <a:fld id="{840AACF3-37AF-A548-ACC1-1F41B9031AAC}" type="datetime1">
-              <a:t>2019-05-23</a:t>
+              <a:t>6/5/2019</a:t>
             </a:fld>
             <a:endParaRPr lang="sv-SE"/>
           </a:p>
@@ -1318,7 +1318,7 @@
           <a:lstStyle/>
           <a:p>
             <a:fld id="{F7C06B23-2216-5640-9639-390C05E8E2F9}" type="datetime1">
-              <a:t>2019-05-23</a:t>
+              <a:t>6/5/2019</a:t>
             </a:fld>
             <a:endParaRPr lang="sv-SE"/>
           </a:p>
@@ -1680,7 +1680,7 @@
           <a:lstStyle/>
           <a:p>
             <a:fld id="{9B1397CB-A82D-2A44-9159-FFC3DA7F5988}" type="datetime1">
-              <a:t>2019-05-23</a:t>
+              <a:t>6/5/2019</a:t>
             </a:fld>
             <a:endParaRPr lang="sv-SE"/>
           </a:p>
@@ -1800,7 +1800,7 @@
           <a:lstStyle/>
           <a:p>
             <a:fld id="{BA164D19-F7B9-C047-8843-E74B1555EBE5}" type="datetime1">
-              <a:t>2019-05-23</a:t>
+              <a:t>6/5/2019</a:t>
             </a:fld>
             <a:endParaRPr lang="sv-SE"/>
           </a:p>
@@ -1893,7 +1893,7 @@
           <a:lstStyle/>
           <a:p>
             <a:fld id="{8711B8DD-2978-CF46-82A5-C5C433C1AABD}" type="datetime1">
-              <a:t>2019-05-23</a:t>
+              <a:t>6/5/2019</a:t>
             </a:fld>
             <a:endParaRPr lang="sv-SE"/>
           </a:p>
@@ -2102,7 +2102,7 @@
           </a:lstStyle>
           <a:p>
             <a:fld id="{1C70CCC2-C365-9348-8CB6-8D14A4E27626}" type="datetime1">
-              <a:t>2019-05-23</a:t>
+              <a:t>6/5/2019</a:t>
             </a:fld>
             <a:endParaRPr lang="sv-SE"/>
           </a:p>
@@ -2528,7 +2528,6 @@
               <a:rPr lang="sv-SE" dirty="0"/>
               <a:t>GraphEditor Introduction</a:t>
             </a:r>
-            <a:endParaRPr lang="sv-SE"/>
           </a:p>
         </p:txBody>
       </p:sp>
@@ -2555,7 +2554,7 @@
           <a:p>
             <a:r>
               <a:rPr lang="sv-SE" dirty="0"/>
-              <a:t>Phuse EU Connect 2018</a:t>
+              <a:t>PhUSE CSS 2019</a:t>
             </a:r>
           </a:p>
         </p:txBody>

</xml_diff>